<commit_message>
Inhaltsverzeichnis, Folien sortiert nach Reihefolge auf dem Bewertungsbogen
Jemand anderes muss es hübsch machen, Powerpoint Online ist kacke, wenn es um Details geht.
- Daniel
</commit_message>
<xml_diff>
--- a/organisation/documentation/GeProz/Präsentation/Gesamtpräsentation Carscout GProz.pptx
+++ b/organisation/documentation/GeProz/Präsentation/Gesamtpräsentation Carscout GProz.pptx
@@ -5,24 +5,26 @@
     <p:sldMasterId id="2147483648" r:id="rId1"/>
   </p:sldMasterIdLst>
   <p:notesMasterIdLst>
-    <p:notesMasterId r:id="rId17"/>
+    <p:notesMasterId r:id="rId19"/>
   </p:notesMasterIdLst>
   <p:sldIdLst>
-    <p:sldId id="257" r:id="rId2"/>
-    <p:sldId id="258" r:id="rId3"/>
-    <p:sldId id="259" r:id="rId4"/>
-    <p:sldId id="264" r:id="rId5"/>
-    <p:sldId id="262" r:id="rId6"/>
-    <p:sldId id="263" r:id="rId7"/>
-    <p:sldId id="261" r:id="rId8"/>
-    <p:sldId id="260" r:id="rId9"/>
-    <p:sldId id="268" r:id="rId10"/>
-    <p:sldId id="267" r:id="rId11"/>
+    <p:sldId id="274" r:id="rId2"/>
+    <p:sldId id="275" r:id="rId3"/>
+    <p:sldId id="257" r:id="rId4"/>
+    <p:sldId id="258" r:id="rId5"/>
+    <p:sldId id="259" r:id="rId6"/>
+    <p:sldId id="264" r:id="rId7"/>
+    <p:sldId id="262" r:id="rId8"/>
+    <p:sldId id="263" r:id="rId9"/>
+    <p:sldId id="261" r:id="rId10"/>
+    <p:sldId id="260" r:id="rId11"/>
     <p:sldId id="272" r:id="rId12"/>
     <p:sldId id="271" r:id="rId13"/>
     <p:sldId id="270" r:id="rId14"/>
     <p:sldId id="269" r:id="rId15"/>
-    <p:sldId id="266" r:id="rId16"/>
+    <p:sldId id="267" r:id="rId16"/>
+    <p:sldId id="268" r:id="rId17"/>
+    <p:sldId id="266" r:id="rId18"/>
   </p:sldIdLst>
   <p:sldSz cx="9144000" cy="6858000" type="screen4x3"/>
   <p:notesSz cx="6858000" cy="9144000"/>
@@ -816,7 +818,7 @@
                 <a:latin typeface="Times New Roman" panose="02020603050405020304" pitchFamily="18" charset="0"/>
               </a:rPr>
               <a:pPr/>
-              <a:t>11</a:t>
+              <a:t>13</a:t>
             </a:fld>
             <a:endParaRPr lang="de-DE" altLang="de-DE">
               <a:solidFill>
@@ -1249,7 +1251,7 @@
                 <a:latin typeface="Times New Roman" panose="02020603050405020304" pitchFamily="18" charset="0"/>
               </a:rPr>
               <a:pPr/>
-              <a:t>11</a:t>
+              <a:t>14</a:t>
             </a:fld>
             <a:endParaRPr lang="de-DE" altLang="de-DE">
               <a:solidFill>
@@ -1682,7 +1684,7 @@
                 <a:latin typeface="Times New Roman" panose="02020603050405020304" pitchFamily="18" charset="0"/>
               </a:rPr>
               <a:pPr/>
-              <a:t>11</a:t>
+              <a:t>15</a:t>
             </a:fld>
             <a:endParaRPr lang="de-DE" altLang="de-DE">
               <a:solidFill>
@@ -2115,7 +2117,7 @@
                 <a:latin typeface="Times New Roman" panose="02020603050405020304" pitchFamily="18" charset="0"/>
               </a:rPr>
               <a:pPr/>
-              <a:t>11</a:t>
+              <a:t>16</a:t>
             </a:fld>
             <a:endParaRPr lang="de-DE" altLang="de-DE">
               <a:solidFill>
@@ -5322,73 +5324,122 @@
       </p:grpSpPr>
       <p:sp>
         <p:nvSpPr>
-          <p:cNvPr id="2" name="Titel 1"/>
+          <p:cNvPr id="2" name="Titel 1">
+            <a:extLst>
+              <a:ext uri="{FF2B5EF4-FFF2-40B4-BE49-F238E27FC236}">
+                <a16:creationId xmlns:a16="http://schemas.microsoft.com/office/drawing/2014/main" id="{CC52DB58-D6E1-44FB-9671-A2651376FE3F}"/>
+              </a:ext>
+            </a:extLst>
+          </p:cNvPr>
           <p:cNvSpPr>
             <a:spLocks noGrp="1"/>
           </p:cNvSpPr>
           <p:nvPr>
-            <p:ph type="title"/>
+            <p:ph type="ctrTitle"/>
+          </p:nvPr>
+        </p:nvSpPr>
+        <p:spPr>
+          <a:xfrm>
+            <a:off x="700177" y="1814123"/>
+            <a:ext cx="7772400" cy="1470025"/>
+          </a:xfrm>
+        </p:spPr>
+        <p:txBody>
+          <a:bodyPr vert="horz" lIns="91440" tIns="45720" rIns="91440" bIns="45720" rtlCol="0" anchor="ctr">
+            <a:noAutofit/>
+          </a:bodyPr>
+          <a:lstStyle/>
+          <a:p>
+            <a:r>
+              <a:rPr lang="de-DE" sz="5400" dirty="0">
+                <a:cs typeface="Calibri"/>
+              </a:rPr>
+              <a:t>Marketingkonzept</a:t>
+            </a:r>
+            <a:br>
+              <a:rPr lang="de-DE" sz="5400" dirty="0">
+                <a:cs typeface="Calibri"/>
+              </a:rPr>
+            </a:br>
+            <a:r>
+              <a:rPr lang="de-DE" sz="5400" dirty="0" err="1">
+                <a:cs typeface="Calibri"/>
+              </a:rPr>
+              <a:t>Carscout</a:t>
+            </a:r>
+            <a:endParaRPr lang="de-DE" dirty="0" err="1"/>
+          </a:p>
+        </p:txBody>
+      </p:sp>
+      <p:sp>
+        <p:nvSpPr>
+          <p:cNvPr id="3" name="Untertitel 2">
+            <a:extLst>
+              <a:ext uri="{FF2B5EF4-FFF2-40B4-BE49-F238E27FC236}">
+                <a16:creationId xmlns:a16="http://schemas.microsoft.com/office/drawing/2014/main" id="{FE798E9C-2A42-4145-B948-C8F681B07BD3}"/>
+              </a:ext>
+            </a:extLst>
+          </p:cNvPr>
+          <p:cNvSpPr>
+            <a:spLocks noGrp="1"/>
+          </p:cNvSpPr>
+          <p:nvPr>
+            <p:ph type="subTitle" idx="1"/>
           </p:nvPr>
         </p:nvSpPr>
         <p:spPr/>
         <p:txBody>
-          <a:bodyPr/>
+          <a:bodyPr vert="horz" lIns="91440" tIns="45720" rIns="91440" bIns="45720" rtlCol="0" anchor="t">
+            <a:normAutofit/>
+          </a:bodyPr>
           <a:lstStyle/>
           <a:p>
             <a:r>
-              <a:rPr lang="de-DE" dirty="0"/>
-              <a:t>Ist-Analyse</a:t>
-            </a:r>
-          </a:p>
-        </p:txBody>
-      </p:sp>
-      <p:sp>
-        <p:nvSpPr>
-          <p:cNvPr id="3" name="Inhaltsplatzhalter 2"/>
-          <p:cNvSpPr>
-            <a:spLocks noGrp="1"/>
-          </p:cNvSpPr>
-          <p:nvPr>
-            <p:ph idx="1"/>
-          </p:nvPr>
-        </p:nvSpPr>
-        <p:spPr/>
-        <p:txBody>
-          <a:bodyPr/>
-          <a:lstStyle/>
-          <a:p>
-            <a:r>
-              <a:rPr lang="de-DE" dirty="0"/>
-              <a:t>Komplexität und Variantenvielfalt</a:t>
-            </a:r>
-          </a:p>
-          <a:p>
-            <a:r>
-              <a:rPr lang="de-DE" dirty="0"/>
-              <a:t>Beratung fällt weg</a:t>
-            </a:r>
-          </a:p>
-          <a:p>
-            <a:r>
-              <a:rPr lang="de-DE" dirty="0"/>
-              <a:t>Zu überfüllte Benutzeroberflächen</a:t>
-            </a:r>
-          </a:p>
-          <a:p>
-            <a:r>
-              <a:rPr lang="de-DE" dirty="0"/>
-              <a:t>Flut an Informationen</a:t>
-            </a:r>
-          </a:p>
-          <a:p>
-            <a:r>
-              <a:rPr lang="de-DE" dirty="0"/>
-              <a:t>Benutzer sind teilweise überfordert</a:t>
-            </a:r>
+              <a:rPr lang="de-DE" dirty="0">
+                <a:cs typeface="Calibri"/>
+              </a:rPr>
+              <a:t>Von Milan </a:t>
+            </a:r>
+            <a:r>
+              <a:rPr lang="de-DE" dirty="0" err="1">
+                <a:cs typeface="Calibri"/>
+              </a:rPr>
+              <a:t>Skripalle</a:t>
+            </a:r>
+            <a:r>
+              <a:rPr lang="de-DE" dirty="0">
+                <a:cs typeface="Calibri"/>
+              </a:rPr>
+              <a:t>, Can Dündar, Antonios </a:t>
+            </a:r>
+            <a:r>
+              <a:rPr lang="de-DE" dirty="0" err="1">
+                <a:cs typeface="Calibri"/>
+              </a:rPr>
+              <a:t>Vamvakos</a:t>
+            </a:r>
+            <a:r>
+              <a:rPr lang="de-DE" dirty="0">
+                <a:cs typeface="Calibri"/>
+              </a:rPr>
+              <a:t>, Philipp Heitmann, Daniel Peters, </a:t>
+            </a:r>
+            <a:r>
+              <a:rPr lang="de-DE" dirty="0" err="1">
+                <a:cs typeface="Calibri"/>
+              </a:rPr>
+              <a:t>Jenniffer</a:t>
+            </a:r>
+            <a:endParaRPr lang="de-DE" dirty="0" err="1"/>
           </a:p>
         </p:txBody>
       </p:sp>
     </p:spTree>
+    <p:extLst>
+      <p:ext uri="{BB962C8B-B14F-4D97-AF65-F5344CB8AC3E}">
+        <p14:creationId xmlns:p14="http://schemas.microsoft.com/office/powerpoint/2010/main" val="3359808482"/>
+      </p:ext>
+    </p:extLst>
   </p:cSld>
   <p:clrMapOvr>
     <a:masterClrMapping/>
@@ -5415,18 +5466,36 @@
       </p:grpSpPr>
       <p:sp>
         <p:nvSpPr>
-          <p:cNvPr id="2" name="Titel 1">
-            <a:extLst>
-              <a:ext uri="{FF2B5EF4-FFF2-40B4-BE49-F238E27FC236}">
-                <a16:creationId xmlns:a16="http://schemas.microsoft.com/office/drawing/2014/main" id="{17D43009-F22A-4327-AC45-D7290B63436A}"/>
-              </a:ext>
-            </a:extLst>
-          </p:cNvPr>
+          <p:cNvPr id="2" name="Titel 1"/>
           <p:cNvSpPr>
             <a:spLocks noGrp="1"/>
           </p:cNvSpPr>
           <p:nvPr>
             <p:ph type="title"/>
+          </p:nvPr>
+        </p:nvSpPr>
+        <p:spPr/>
+        <p:txBody>
+          <a:bodyPr>
+            <a:normAutofit/>
+          </a:bodyPr>
+          <a:lstStyle/>
+          <a:p>
+            <a:r>
+              <a:rPr lang="de-DE" dirty="0"/>
+              <a:t>Marktanalyse – Weitere Faktoren</a:t>
+            </a:r>
+          </a:p>
+        </p:txBody>
+      </p:sp>
+      <p:sp>
+        <p:nvSpPr>
+          <p:cNvPr id="3" name="Inhaltsplatzhalter 2"/>
+          <p:cNvSpPr>
+            <a:spLocks noGrp="1"/>
+          </p:cNvSpPr>
+          <p:nvPr>
+            <p:ph idx="1"/>
           </p:nvPr>
         </p:nvSpPr>
         <p:spPr/>
@@ -5435,121 +5504,39 @@
           <a:lstStyle/>
           <a:p>
             <a:r>
-              <a:rPr lang="de-DE" dirty="0">
-                <a:cs typeface="Calibri Light"/>
-              </a:rPr>
-              <a:t>Kommunikationspolitik</a:t>
-            </a:r>
-            <a:endParaRPr lang="de-DE" dirty="0"/>
-          </a:p>
-          <a:p>
-            <a:endParaRPr lang="de-DE" dirty="0">
-              <a:cs typeface="Calibri Light"/>
-            </a:endParaRPr>
-          </a:p>
-        </p:txBody>
-      </p:sp>
-      <p:sp>
-        <p:nvSpPr>
-          <p:cNvPr id="3" name="Inhaltsplatzhalter 2">
-            <a:extLst>
-              <a:ext uri="{FF2B5EF4-FFF2-40B4-BE49-F238E27FC236}">
-                <a16:creationId xmlns:a16="http://schemas.microsoft.com/office/drawing/2014/main" id="{E3D95D5C-D1C2-4078-BA56-2BCCEFA6812F}"/>
-              </a:ext>
-            </a:extLst>
-          </p:cNvPr>
-          <p:cNvSpPr>
-            <a:spLocks noGrp="1"/>
-          </p:cNvSpPr>
-          <p:nvPr>
-            <p:ph idx="1"/>
-          </p:nvPr>
-        </p:nvSpPr>
-        <p:spPr>
-          <a:xfrm>
-            <a:off x="551485" y="1657380"/>
-            <a:ext cx="7886700" cy="3263504"/>
-          </a:xfrm>
-        </p:spPr>
-        <p:txBody>
-          <a:bodyPr vert="horz" lIns="68580" tIns="34290" rIns="68580" bIns="34290" rtlCol="0" anchor="t">
-            <a:noAutofit/>
-          </a:bodyPr>
-          <a:lstStyle/>
-          <a:p>
-            <a:r>
-              <a:rPr lang="de-DE" sz="2800" dirty="0">
-                <a:cs typeface="Calibri"/>
-              </a:rPr>
-              <a:t>Search Ranking bei Google erhöhen lassen</a:t>
-            </a:r>
-          </a:p>
-          <a:p>
-            <a:r>
-              <a:rPr lang="de-DE" sz="2800" dirty="0">
-                <a:cs typeface="Calibri"/>
-              </a:rPr>
-              <a:t>Stichworte zum Thema Auto, Gebrauchtwagen</a:t>
-            </a:r>
-          </a:p>
-          <a:p>
-            <a:r>
-              <a:rPr lang="de-DE" sz="2800" dirty="0">
-                <a:cs typeface="Calibri"/>
-              </a:rPr>
-              <a:t>Werbeclips vor </a:t>
-            </a:r>
-            <a:r>
-              <a:rPr lang="de-DE" sz="2800" dirty="0" err="1">
-                <a:cs typeface="Calibri"/>
-              </a:rPr>
-              <a:t>Youtube</a:t>
-            </a:r>
-            <a:r>
-              <a:rPr lang="de-DE" sz="2800" dirty="0">
-                <a:cs typeface="Calibri"/>
-              </a:rPr>
-              <a:t>-Videos</a:t>
-            </a:r>
-          </a:p>
-          <a:p>
-            <a:r>
-              <a:rPr lang="de-DE" sz="2800" dirty="0">
-                <a:cs typeface="Calibri"/>
-              </a:rPr>
-              <a:t>Gesponserte Videos von "Influencern"</a:t>
-            </a:r>
-          </a:p>
-          <a:p>
-            <a:r>
-              <a:rPr lang="de-DE" sz="2800" dirty="0">
-                <a:cs typeface="Calibri"/>
-              </a:rPr>
-              <a:t>Bevorzugt Personen mit Präsenz im Bereich Autos</a:t>
-            </a:r>
-          </a:p>
-          <a:p>
-            <a:r>
-              <a:rPr lang="de-DE" sz="2800" dirty="0">
-                <a:cs typeface="Calibri"/>
-              </a:rPr>
-              <a:t>Werbelinks mit Discount auf </a:t>
-            </a:r>
-            <a:r>
-              <a:rPr lang="de-DE" sz="2800" dirty="0" err="1">
-                <a:cs typeface="Calibri"/>
-              </a:rPr>
-              <a:t>Premiumaccountkäufe</a:t>
+              <a:rPr lang="de-DE" dirty="0"/>
+              <a:t>Fahrverbote für Diesel-Fahrzeuge</a:t>
+            </a:r>
+          </a:p>
+          <a:p>
+            <a:pPr lvl="1"/>
+            <a:r>
+              <a:rPr lang="de-DE" dirty="0"/>
+              <a:t>Mehr Neuwagenkäufe : mehr Gebrauchtwagen</a:t>
+            </a:r>
+          </a:p>
+          <a:p>
+            <a:r>
+              <a:rPr lang="de-DE" dirty="0"/>
+              <a:t>Schwerverkäufliche Diesel-Fahrzeuge </a:t>
+            </a:r>
+          </a:p>
+          <a:p>
+            <a:pPr lvl="1"/>
+            <a:r>
+              <a:rPr lang="de-DE" dirty="0"/>
+              <a:t>Händler verbreitern ihre Reichweiten durch neue Plattformen</a:t>
+            </a:r>
+          </a:p>
+          <a:p>
+            <a:r>
+              <a:rPr lang="de-DE" dirty="0"/>
+              <a:t>Interesse an Gebrauchtfahrzeugen steigt</a:t>
             </a:r>
           </a:p>
         </p:txBody>
       </p:sp>
     </p:spTree>
-    <p:extLst>
-      <p:ext uri="{BB962C8B-B14F-4D97-AF65-F5344CB8AC3E}">
-        <p14:creationId xmlns:p14="http://schemas.microsoft.com/office/powerpoint/2010/main" val="873107796"/>
-      </p:ext>
-    </p:extLst>
   </p:cSld>
   <p:clrMapOvr>
     <a:masterClrMapping/>
@@ -6823,8 +6810,8 @@
               </a:tabLst>
             </a:pPr>
             <a:r>
-              <a:rPr lang="de-DE" altLang="de-DE"/>
-              <a:t>Preisstrategie</a:t>
+              <a:rPr lang="de-DE" altLang="de-DE" dirty="0"/>
+              <a:t> Preisstrategie</a:t>
             </a:r>
           </a:p>
         </p:txBody>
@@ -7883,6 +7870,316 @@
       </p:grpSpPr>
       <p:sp>
         <p:nvSpPr>
+          <p:cNvPr id="2" name="Titel 1">
+            <a:extLst>
+              <a:ext uri="{FF2B5EF4-FFF2-40B4-BE49-F238E27FC236}">
+                <a16:creationId xmlns:a16="http://schemas.microsoft.com/office/drawing/2014/main" id="{17D43009-F22A-4327-AC45-D7290B63436A}"/>
+              </a:ext>
+            </a:extLst>
+          </p:cNvPr>
+          <p:cNvSpPr>
+            <a:spLocks noGrp="1"/>
+          </p:cNvSpPr>
+          <p:nvPr>
+            <p:ph type="title"/>
+          </p:nvPr>
+        </p:nvSpPr>
+        <p:spPr/>
+        <p:txBody>
+          <a:bodyPr/>
+          <a:lstStyle/>
+          <a:p>
+            <a:r>
+              <a:rPr lang="de-DE" dirty="0">
+                <a:cs typeface="Calibri Light"/>
+              </a:rPr>
+              <a:t>Kommunikationspolitik</a:t>
+            </a:r>
+            <a:endParaRPr lang="de-DE" dirty="0"/>
+          </a:p>
+          <a:p>
+            <a:endParaRPr lang="de-DE" dirty="0">
+              <a:cs typeface="Calibri Light"/>
+            </a:endParaRPr>
+          </a:p>
+        </p:txBody>
+      </p:sp>
+      <p:sp>
+        <p:nvSpPr>
+          <p:cNvPr id="3" name="Inhaltsplatzhalter 2">
+            <a:extLst>
+              <a:ext uri="{FF2B5EF4-FFF2-40B4-BE49-F238E27FC236}">
+                <a16:creationId xmlns:a16="http://schemas.microsoft.com/office/drawing/2014/main" id="{E3D95D5C-D1C2-4078-BA56-2BCCEFA6812F}"/>
+              </a:ext>
+            </a:extLst>
+          </p:cNvPr>
+          <p:cNvSpPr>
+            <a:spLocks noGrp="1"/>
+          </p:cNvSpPr>
+          <p:nvPr>
+            <p:ph idx="1"/>
+          </p:nvPr>
+        </p:nvSpPr>
+        <p:spPr>
+          <a:xfrm>
+            <a:off x="551485" y="1657380"/>
+            <a:ext cx="7886700" cy="3263504"/>
+          </a:xfrm>
+        </p:spPr>
+        <p:txBody>
+          <a:bodyPr vert="horz" lIns="68580" tIns="34290" rIns="68580" bIns="34290" rtlCol="0" anchor="t">
+            <a:noAutofit/>
+          </a:bodyPr>
+          <a:lstStyle/>
+          <a:p>
+            <a:r>
+              <a:rPr lang="de-DE" sz="2800" dirty="0">
+                <a:cs typeface="Calibri"/>
+              </a:rPr>
+              <a:t>Search Ranking bei Google erhöhen lassen</a:t>
+            </a:r>
+          </a:p>
+          <a:p>
+            <a:r>
+              <a:rPr lang="de-DE" sz="2800" dirty="0">
+                <a:cs typeface="Calibri"/>
+              </a:rPr>
+              <a:t>Stichworte zum Thema Auto, Gebrauchtwagen</a:t>
+            </a:r>
+          </a:p>
+          <a:p>
+            <a:r>
+              <a:rPr lang="de-DE" sz="2800" dirty="0">
+                <a:cs typeface="Calibri"/>
+              </a:rPr>
+              <a:t>Werbeclips vor </a:t>
+            </a:r>
+            <a:r>
+              <a:rPr lang="de-DE" sz="2800" dirty="0" err="1">
+                <a:cs typeface="Calibri"/>
+              </a:rPr>
+              <a:t>Youtube</a:t>
+            </a:r>
+            <a:r>
+              <a:rPr lang="de-DE" sz="2800" dirty="0">
+                <a:cs typeface="Calibri"/>
+              </a:rPr>
+              <a:t>-Videos</a:t>
+            </a:r>
+          </a:p>
+          <a:p>
+            <a:r>
+              <a:rPr lang="de-DE" sz="2800" dirty="0">
+                <a:cs typeface="Calibri"/>
+              </a:rPr>
+              <a:t>Gesponserte Videos von "Influencern"</a:t>
+            </a:r>
+          </a:p>
+          <a:p>
+            <a:r>
+              <a:rPr lang="de-DE" sz="2800" dirty="0">
+                <a:cs typeface="Calibri"/>
+              </a:rPr>
+              <a:t>Bevorzugt Personen mit Präsenz im Bereich Autos</a:t>
+            </a:r>
+          </a:p>
+          <a:p>
+            <a:r>
+              <a:rPr lang="de-DE" sz="2800" dirty="0">
+                <a:cs typeface="Calibri"/>
+              </a:rPr>
+              <a:t>Werbelinks mit Discount auf </a:t>
+            </a:r>
+            <a:r>
+              <a:rPr lang="de-DE" sz="2800" dirty="0" err="1">
+                <a:cs typeface="Calibri"/>
+              </a:rPr>
+              <a:t>Premiumaccountkäufe</a:t>
+            </a:r>
+          </a:p>
+        </p:txBody>
+      </p:sp>
+    </p:spTree>
+    <p:extLst>
+      <p:ext uri="{BB962C8B-B14F-4D97-AF65-F5344CB8AC3E}">
+        <p14:creationId xmlns:p14="http://schemas.microsoft.com/office/powerpoint/2010/main" val="873107796"/>
+      </p:ext>
+    </p:extLst>
+  </p:cSld>
+  <p:clrMapOvr>
+    <a:masterClrMapping/>
+  </p:clrMapOvr>
+</p:sld>
+</file>
+
+<file path=ppt/slides/slide16.xml><?xml version="1.0" encoding="utf-8"?>
+<p:sld xmlns:a="http://schemas.openxmlformats.org/drawingml/2006/main" xmlns:r="http://schemas.openxmlformats.org/officeDocument/2006/relationships" xmlns:p="http://schemas.openxmlformats.org/presentationml/2006/main">
+  <p:cSld>
+    <p:spTree>
+      <p:nvGrpSpPr>
+        <p:cNvPr id="1" name=""/>
+        <p:cNvGrpSpPr/>
+        <p:nvPr/>
+      </p:nvGrpSpPr>
+      <p:grpSpPr>
+        <a:xfrm>
+          <a:off x="0" y="0"/>
+          <a:ext cx="0" cy="0"/>
+          <a:chOff x="0" y="0"/>
+          <a:chExt cx="0" cy="0"/>
+        </a:xfrm>
+      </p:grpSpPr>
+      <p:sp>
+        <p:nvSpPr>
+          <p:cNvPr id="2" name="Titel 1">
+            <a:extLst>
+              <a:ext uri="{FF2B5EF4-FFF2-40B4-BE49-F238E27FC236}">
+                <a16:creationId xmlns:a16="http://schemas.microsoft.com/office/drawing/2014/main" id="{04B64357-0EE4-45AC-9770-F6FFFD376720}"/>
+              </a:ext>
+            </a:extLst>
+          </p:cNvPr>
+          <p:cNvSpPr>
+            <a:spLocks noGrp="1"/>
+          </p:cNvSpPr>
+          <p:nvPr>
+            <p:ph type="title"/>
+          </p:nvPr>
+        </p:nvSpPr>
+        <p:spPr/>
+        <p:txBody>
+          <a:bodyPr/>
+          <a:lstStyle/>
+          <a:p>
+            <a:r>
+              <a:rPr lang="de-DE" dirty="0">
+                <a:cs typeface="Calibri Light"/>
+              </a:rPr>
+              <a:t>Distributionspolitik</a:t>
+            </a:r>
+            <a:endParaRPr lang="de-DE" dirty="0"/>
+          </a:p>
+          <a:p>
+            <a:endParaRPr lang="de-DE" dirty="0">
+              <a:cs typeface="Calibri Light"/>
+            </a:endParaRPr>
+          </a:p>
+        </p:txBody>
+      </p:sp>
+      <p:sp>
+        <p:nvSpPr>
+          <p:cNvPr id="3" name="Inhaltsplatzhalter 2">
+            <a:extLst>
+              <a:ext uri="{FF2B5EF4-FFF2-40B4-BE49-F238E27FC236}">
+                <a16:creationId xmlns:a16="http://schemas.microsoft.com/office/drawing/2014/main" id="{EA2DB675-491C-4047-964A-FDB43988A241}"/>
+              </a:ext>
+            </a:extLst>
+          </p:cNvPr>
+          <p:cNvSpPr>
+            <a:spLocks noGrp="1"/>
+          </p:cNvSpPr>
+          <p:nvPr>
+            <p:ph idx="1"/>
+          </p:nvPr>
+        </p:nvSpPr>
+        <p:spPr/>
+        <p:txBody>
+          <a:bodyPr vert="horz" lIns="68580" tIns="34290" rIns="68580" bIns="34290" rtlCol="0" anchor="t">
+            <a:normAutofit/>
+          </a:bodyPr>
+          <a:lstStyle/>
+          <a:p>
+            <a:r>
+              <a:rPr lang="de-DE" dirty="0">
+                <a:cs typeface="Calibri"/>
+              </a:rPr>
+              <a:t>Eine Website, keine verkaufbare Software</a:t>
+            </a:r>
+          </a:p>
+          <a:p>
+            <a:r>
+              <a:rPr lang="de-DE" dirty="0">
+                <a:cs typeface="Calibri"/>
+              </a:rPr>
+              <a:t>-&gt; nicht verteilbar</a:t>
+            </a:r>
+          </a:p>
+          <a:p>
+            <a:r>
+              <a:rPr lang="de-DE" dirty="0">
+                <a:cs typeface="Calibri"/>
+              </a:rPr>
+              <a:t>Kunden kommen zu uns</a:t>
+            </a:r>
+          </a:p>
+          <a:p>
+            <a:pPr marL="0" indent="0">
+              <a:buNone/>
+            </a:pPr>
+            <a:endParaRPr lang="de-DE" dirty="0">
+              <a:cs typeface="Calibri"/>
+            </a:endParaRPr>
+          </a:p>
+          <a:p>
+            <a:r>
+              <a:rPr lang="de-DE" dirty="0" err="1">
+                <a:cs typeface="Calibri"/>
+              </a:rPr>
+              <a:t>Premiumaccounts</a:t>
+            </a:r>
+            <a:r>
+              <a:rPr lang="de-DE" dirty="0">
+                <a:cs typeface="Calibri"/>
+              </a:rPr>
+              <a:t> nur auf direktem Absatzweg</a:t>
+            </a:r>
+          </a:p>
+          <a:p>
+            <a:endParaRPr lang="de-DE" dirty="0">
+              <a:cs typeface="Calibri"/>
+            </a:endParaRPr>
+          </a:p>
+          <a:p>
+            <a:r>
+              <a:rPr lang="de-DE" dirty="0">
+                <a:cs typeface="Calibri"/>
+              </a:rPr>
+              <a:t>Keine Filialen</a:t>
+            </a:r>
+          </a:p>
+        </p:txBody>
+      </p:sp>
+    </p:spTree>
+    <p:extLst>
+      <p:ext uri="{BB962C8B-B14F-4D97-AF65-F5344CB8AC3E}">
+        <p14:creationId xmlns:p14="http://schemas.microsoft.com/office/powerpoint/2010/main" val="3540266070"/>
+      </p:ext>
+    </p:extLst>
+  </p:cSld>
+  <p:clrMapOvr>
+    <a:masterClrMapping/>
+  </p:clrMapOvr>
+</p:sld>
+</file>
+
+<file path=ppt/slides/slide17.xml><?xml version="1.0" encoding="utf-8"?>
+<p:sld xmlns:a="http://schemas.openxmlformats.org/drawingml/2006/main" xmlns:r="http://schemas.openxmlformats.org/officeDocument/2006/relationships" xmlns:p="http://schemas.openxmlformats.org/presentationml/2006/main">
+  <p:cSld>
+    <p:spTree>
+      <p:nvGrpSpPr>
+        <p:cNvPr id="1" name=""/>
+        <p:cNvGrpSpPr/>
+        <p:nvPr/>
+      </p:nvGrpSpPr>
+      <p:grpSpPr>
+        <a:xfrm>
+          <a:off x="0" y="0"/>
+          <a:ext cx="0" cy="0"/>
+          <a:chOff x="0" y="0"/>
+          <a:chExt cx="0" cy="0"/>
+        </a:xfrm>
+      </p:grpSpPr>
+      <p:sp>
+        <p:nvSpPr>
           <p:cNvPr id="2" name="Titel 1"/>
           <p:cNvSpPr>
             <a:spLocks noGrp="1"/>
@@ -7981,7 +8278,13 @@
       </p:grpSpPr>
       <p:sp>
         <p:nvSpPr>
-          <p:cNvPr id="2" name="Titel 1"/>
+          <p:cNvPr id="2" name="Titel 1">
+            <a:extLst>
+              <a:ext uri="{FF2B5EF4-FFF2-40B4-BE49-F238E27FC236}">
+                <a16:creationId xmlns:a16="http://schemas.microsoft.com/office/drawing/2014/main" id="{5E1DAADD-77DF-428B-911E-75F014C5949B}"/>
+              </a:ext>
+            </a:extLst>
+          </p:cNvPr>
           <p:cNvSpPr>
             <a:spLocks noGrp="1"/>
           </p:cNvSpPr>
@@ -7989,21 +8292,36 @@
             <p:ph type="title"/>
           </p:nvPr>
         </p:nvSpPr>
-        <p:spPr/>
-        <p:txBody>
-          <a:bodyPr/>
+        <p:spPr>
+          <a:xfrm>
+            <a:off x="457200" y="-4362"/>
+            <a:ext cx="8229600" cy="1215000"/>
+          </a:xfrm>
+        </p:spPr>
+        <p:txBody>
+          <a:bodyPr>
+            <a:normAutofit/>
+          </a:bodyPr>
           <a:lstStyle/>
           <a:p>
             <a:r>
-              <a:rPr lang="de-DE" dirty="0"/>
-              <a:t>Soll-Analyse</a:t>
-            </a:r>
-          </a:p>
-        </p:txBody>
-      </p:sp>
-      <p:sp>
-        <p:nvSpPr>
-          <p:cNvPr id="3" name="Inhaltsplatzhalter 2"/>
+              <a:rPr lang="de-DE" sz="4000" dirty="0">
+                <a:cs typeface="Calibri"/>
+              </a:rPr>
+              <a:t>Inhaltsverzeichnis</a:t>
+            </a:r>
+          </a:p>
+        </p:txBody>
+      </p:sp>
+      <p:sp>
+        <p:nvSpPr>
+          <p:cNvPr id="3" name="Inhaltsplatzhalter 2">
+            <a:extLst>
+              <a:ext uri="{FF2B5EF4-FFF2-40B4-BE49-F238E27FC236}">
+                <a16:creationId xmlns:a16="http://schemas.microsoft.com/office/drawing/2014/main" id="{943D0D00-FDCE-40DE-A0B6-9F6EC62AA1A3}"/>
+              </a:ext>
+            </a:extLst>
+          </p:cNvPr>
           <p:cNvSpPr>
             <a:spLocks noGrp="1"/>
           </p:cNvSpPr>
@@ -8011,49 +8329,210 @@
             <p:ph idx="1"/>
           </p:nvPr>
         </p:nvSpPr>
-        <p:spPr/>
-        <p:txBody>
-          <a:bodyPr/>
+        <p:spPr>
+          <a:xfrm>
+            <a:off x="457200" y="1582200"/>
+            <a:ext cx="8229600" cy="4525963"/>
+          </a:xfrm>
+        </p:spPr>
+        <p:txBody>
+          <a:bodyPr vert="horz" lIns="91440" tIns="45720" rIns="91440" bIns="45720" rtlCol="0" anchor="t">
+            <a:normAutofit fontScale="70000" lnSpcReduction="20000"/>
+          </a:bodyPr>
           <a:lstStyle/>
           <a:p>
-            <a:r>
-              <a:rPr lang="de-DE" dirty="0"/>
-              <a:t>Keine Verdrängungsstrategie / Marktführung</a:t>
-            </a:r>
-          </a:p>
-          <a:p>
-            <a:r>
-              <a:rPr lang="de-DE" dirty="0"/>
-              <a:t>Sehr starkes Angebot / Nachfrage an Autos</a:t>
-            </a:r>
-          </a:p>
-          <a:p>
-            <a:r>
-              <a:rPr lang="de-DE" dirty="0"/>
-              <a:t>Schlanke Plattform</a:t>
-            </a:r>
-          </a:p>
-          <a:p>
-            <a:r>
-              <a:rPr lang="de-DE" dirty="0"/>
-              <a:t>Bestandskunden halten</a:t>
-            </a:r>
-          </a:p>
-          <a:p>
-            <a:r>
-              <a:rPr lang="de-DE" dirty="0"/>
-              <a:t>Neukunden gewinnen</a:t>
-            </a:r>
-          </a:p>
-          <a:p>
+            <a:pPr marL="514350" indent="-514350">
+              <a:buAutoNum type="arabicPeriod"/>
+            </a:pPr>
+            <a:r>
+              <a:rPr lang="de-DE" dirty="0">
+                <a:cs typeface="Calibri"/>
+              </a:rPr>
+              <a:t>Produktpolitik …...............................................................  </a:t>
+            </a:r>
+          </a:p>
+          <a:p>
+            <a:pPr marL="514350" indent="-514350">
+              <a:buAutoNum type="arabicPeriod"/>
+            </a:pPr>
+            <a:r>
+              <a:rPr lang="de-DE" dirty="0">
+                <a:cs typeface="Calibri"/>
+              </a:rPr>
+              <a:t>Ist Analyse …..................................................................... 3</a:t>
+            </a:r>
             <a:endParaRPr lang="de-DE" dirty="0"/>
           </a:p>
           <a:p>
+            <a:pPr marL="514350" indent="-514350">
+              <a:buAutoNum type="arabicPeriod"/>
+            </a:pPr>
+            <a:r>
+              <a:rPr lang="de-DE" dirty="0">
+                <a:cs typeface="Calibri"/>
+              </a:rPr>
+              <a:t>Soll-Analyse …................................................................... 4</a:t>
+            </a:r>
+          </a:p>
+          <a:p>
+            <a:pPr marL="514350" indent="-514350">
+              <a:buAutoNum type="arabicPeriod"/>
+            </a:pPr>
+            <a:r>
+              <a:rPr lang="de-DE" dirty="0">
+                <a:cs typeface="Calibri"/>
+              </a:rPr>
+              <a:t>Marktanalyse …................................................................. 5-10</a:t>
+            </a:r>
+          </a:p>
+          <a:p>
+            <a:pPr marL="971550" lvl="1" indent="-514350">
+              <a:buAutoNum type="arabicPeriod"/>
+            </a:pPr>
+            <a:r>
+              <a:rPr lang="de-DE" dirty="0">
+                <a:cs typeface="Calibri"/>
+              </a:rPr>
+              <a:t>Zielgruppe …......................................................................... 5</a:t>
+            </a:r>
+          </a:p>
+          <a:p>
+            <a:pPr marL="971550" lvl="1" indent="-514350">
+              <a:buAutoNum type="arabicPeriod"/>
+            </a:pPr>
+            <a:r>
+              <a:rPr lang="de-DE" dirty="0">
+                <a:cs typeface="Calibri"/>
+              </a:rPr>
+              <a:t>Markt ….................................................................................... 6-9</a:t>
+            </a:r>
+          </a:p>
+          <a:p>
+            <a:pPr marL="971550" lvl="1" indent="-514350">
+              <a:buAutoNum type="arabicPeriod"/>
+            </a:pPr>
+            <a:r>
+              <a:rPr lang="de-DE" dirty="0">
+                <a:cs typeface="Calibri"/>
+              </a:rPr>
+              <a:t>Konkurrenzanalyse …................................................................ ?</a:t>
+            </a:r>
+          </a:p>
+          <a:p>
+            <a:pPr marL="971550" lvl="1" indent="-514350">
+              <a:buAutoNum type="arabicPeriod"/>
+            </a:pPr>
+            <a:r>
+              <a:rPr lang="de-DE" dirty="0">
+                <a:cs typeface="Calibri"/>
+              </a:rPr>
+              <a:t>Weitere Faktoren ….................................................................. 10</a:t>
+            </a:r>
+          </a:p>
+          <a:p>
+            <a:pPr marL="514350" indent="-514350">
+              <a:buAutoNum type="arabicPeriod"/>
+            </a:pPr>
+            <a:r>
+              <a:rPr lang="de-DE" dirty="0">
+                <a:cs typeface="Calibri"/>
+              </a:rPr>
+              <a:t>Marketingmix …................................................................. 11-16</a:t>
+            </a:r>
             <a:endParaRPr lang="de-DE" dirty="0"/>
           </a:p>
+          <a:p>
+            <a:pPr marL="971550" lvl="1" indent="-514350">
+              <a:buAutoNum type="arabicPeriod"/>
+            </a:pPr>
+            <a:r>
+              <a:rPr lang="de-DE" dirty="0">
+                <a:cs typeface="Calibri"/>
+              </a:rPr>
+              <a:t>Preispolitik …............................................................................ 11-14</a:t>
+            </a:r>
+          </a:p>
+          <a:p>
+            <a:pPr marL="971550" lvl="1" indent="-514350">
+              <a:buAutoNum type="arabicPeriod"/>
+            </a:pPr>
+            <a:r>
+              <a:rPr lang="de-DE" dirty="0">
+                <a:cs typeface="Calibri"/>
+              </a:rPr>
+              <a:t>Kommunikationspolitik …......................................................... 15</a:t>
+            </a:r>
+          </a:p>
+          <a:p>
+            <a:pPr marL="971550" lvl="1" indent="-514350">
+              <a:buAutoNum type="arabicPeriod"/>
+            </a:pPr>
+            <a:r>
+              <a:rPr lang="de-DE" dirty="0">
+                <a:cs typeface="Calibri"/>
+              </a:rPr>
+              <a:t>Distributionspolitik …................................................................ 16</a:t>
+            </a:r>
+          </a:p>
+          <a:p>
+            <a:pPr marL="514350" indent="-514350">
+              <a:buAutoNum type="arabicPeriod"/>
+            </a:pPr>
+            <a:r>
+              <a:rPr lang="de-DE" dirty="0">
+                <a:cs typeface="Calibri"/>
+              </a:rPr>
+              <a:t>Quellen …............................................................................ 17</a:t>
+            </a:r>
+          </a:p>
+          <a:p>
+            <a:pPr marL="514350" indent="-514350">
+              <a:buAutoNum type="arabicPeriod"/>
+            </a:pPr>
+            <a:endParaRPr lang="de-DE" dirty="0">
+              <a:cs typeface="Calibri"/>
+            </a:endParaRPr>
+          </a:p>
+          <a:p>
+            <a:pPr marL="1028700" indent="-514350">
+              <a:buAutoNum type="arabicPeriod"/>
+            </a:pPr>
+            <a:endParaRPr lang="de-DE" dirty="0">
+              <a:cs typeface="Calibri"/>
+            </a:endParaRPr>
+          </a:p>
+          <a:p>
+            <a:pPr marL="1028700" indent="-514350">
+              <a:buAutoNum type="arabicPeriod"/>
+            </a:pPr>
+            <a:endParaRPr lang="de-DE" dirty="0">
+              <a:cs typeface="Calibri"/>
+            </a:endParaRPr>
+          </a:p>
+          <a:p>
+            <a:pPr marL="457200" lvl="1" indent="0">
+              <a:buNone/>
+            </a:pPr>
+            <a:endParaRPr lang="de-DE" dirty="0">
+              <a:cs typeface="Calibri"/>
+            </a:endParaRPr>
+          </a:p>
+          <a:p>
+            <a:pPr marL="457200" lvl="1" indent="0">
+              <a:buNone/>
+            </a:pPr>
+            <a:endParaRPr lang="de-DE" dirty="0">
+              <a:cs typeface="Calibri"/>
+            </a:endParaRPr>
+          </a:p>
         </p:txBody>
       </p:sp>
     </p:spTree>
+    <p:extLst>
+      <p:ext uri="{BB962C8B-B14F-4D97-AF65-F5344CB8AC3E}">
+        <p14:creationId xmlns:p14="http://schemas.microsoft.com/office/powerpoint/2010/main" val="4291367839"/>
+      </p:ext>
+    </p:extLst>
   </p:cSld>
   <p:clrMapOvr>
     <a:masterClrMapping/>
@@ -8095,7 +8574,7 @@
           <a:p>
             <a:r>
               <a:rPr lang="de-DE" dirty="0"/>
-              <a:t>Marktanalyse - Zielgruppe</a:t>
+              <a:t>Ist-Analyse</a:t>
             </a:r>
           </a:p>
         </p:txBody>
@@ -8117,52 +8596,32 @@
           <a:p>
             <a:r>
               <a:rPr lang="de-DE" dirty="0"/>
-              <a:t>Breite Zielgruppe</a:t>
-            </a:r>
-          </a:p>
-          <a:p>
-            <a:pPr lvl="1"/>
+              <a:t>Komplexität und Variantenvielfalt</a:t>
+            </a:r>
+          </a:p>
+          <a:p>
             <a:r>
               <a:rPr lang="de-DE" dirty="0"/>
-              <a:t>18+ bis …</a:t>
-            </a:r>
-          </a:p>
-          <a:p>
-            <a:pPr lvl="1"/>
+              <a:t>Beratung fällt weg</a:t>
+            </a:r>
+          </a:p>
+          <a:p>
             <a:r>
               <a:rPr lang="de-DE" dirty="0"/>
-              <a:t>Alle Geschlechter</a:t>
-            </a:r>
-          </a:p>
-          <a:p>
-            <a:pPr lvl="1"/>
+              <a:t>Zu überfüllte Benutzeroberflächen</a:t>
+            </a:r>
+          </a:p>
+          <a:p>
             <a:r>
               <a:rPr lang="de-DE" dirty="0"/>
-              <a:t>Privatpersonen und Geschäftspersonen</a:t>
-            </a:r>
-          </a:p>
-          <a:p>
-            <a:pPr lvl="1"/>
+              <a:t>Flut an Informationen</a:t>
+            </a:r>
+          </a:p>
+          <a:p>
             <a:r>
               <a:rPr lang="de-DE" dirty="0"/>
-              <a:t>Hauptsächlich Erstverkäufer aber auch Mehrfachverkäufer</a:t>
-            </a:r>
-          </a:p>
-          <a:p>
-            <a:pPr lvl="1"/>
-            <a:r>
-              <a:rPr lang="de-DE" dirty="0"/>
-              <a:t>Kaum Einschränkungen</a:t>
-            </a:r>
-          </a:p>
-          <a:p>
-            <a:endParaRPr lang="de-DE" dirty="0"/>
-          </a:p>
-          <a:p>
-            <a:endParaRPr lang="de-DE" dirty="0"/>
-          </a:p>
-          <a:p>
-            <a:endParaRPr lang="de-DE" dirty="0"/>
+              <a:t>Benutzer sind teilweise überfordert</a:t>
+            </a:r>
           </a:p>
         </p:txBody>
       </p:sp>
@@ -8175,6 +8634,218 @@
 </file>
 
 <file path=ppt/slides/slide4.xml><?xml version="1.0" encoding="utf-8"?>
+<p:sld xmlns:a="http://schemas.openxmlformats.org/drawingml/2006/main" xmlns:r="http://schemas.openxmlformats.org/officeDocument/2006/relationships" xmlns:p="http://schemas.openxmlformats.org/presentationml/2006/main">
+  <p:cSld>
+    <p:spTree>
+      <p:nvGrpSpPr>
+        <p:cNvPr id="1" name=""/>
+        <p:cNvGrpSpPr/>
+        <p:nvPr/>
+      </p:nvGrpSpPr>
+      <p:grpSpPr>
+        <a:xfrm>
+          <a:off x="0" y="0"/>
+          <a:ext cx="0" cy="0"/>
+          <a:chOff x="0" y="0"/>
+          <a:chExt cx="0" cy="0"/>
+        </a:xfrm>
+      </p:grpSpPr>
+      <p:sp>
+        <p:nvSpPr>
+          <p:cNvPr id="2" name="Titel 1"/>
+          <p:cNvSpPr>
+            <a:spLocks noGrp="1"/>
+          </p:cNvSpPr>
+          <p:nvPr>
+            <p:ph type="title"/>
+          </p:nvPr>
+        </p:nvSpPr>
+        <p:spPr/>
+        <p:txBody>
+          <a:bodyPr/>
+          <a:lstStyle/>
+          <a:p>
+            <a:r>
+              <a:rPr lang="de-DE" dirty="0"/>
+              <a:t>Soll-Analyse</a:t>
+            </a:r>
+          </a:p>
+        </p:txBody>
+      </p:sp>
+      <p:sp>
+        <p:nvSpPr>
+          <p:cNvPr id="3" name="Inhaltsplatzhalter 2"/>
+          <p:cNvSpPr>
+            <a:spLocks noGrp="1"/>
+          </p:cNvSpPr>
+          <p:nvPr>
+            <p:ph idx="1"/>
+          </p:nvPr>
+        </p:nvSpPr>
+        <p:spPr/>
+        <p:txBody>
+          <a:bodyPr/>
+          <a:lstStyle/>
+          <a:p>
+            <a:r>
+              <a:rPr lang="de-DE" dirty="0"/>
+              <a:t>Keine Verdrängungsstrategie / Marktführung</a:t>
+            </a:r>
+          </a:p>
+          <a:p>
+            <a:r>
+              <a:rPr lang="de-DE" dirty="0"/>
+              <a:t>Sehr starkes Angebot / Nachfrage an Autos</a:t>
+            </a:r>
+          </a:p>
+          <a:p>
+            <a:r>
+              <a:rPr lang="de-DE" dirty="0"/>
+              <a:t>Schlanke Plattform</a:t>
+            </a:r>
+          </a:p>
+          <a:p>
+            <a:r>
+              <a:rPr lang="de-DE" dirty="0"/>
+              <a:t>Bestandskunden halten</a:t>
+            </a:r>
+          </a:p>
+          <a:p>
+            <a:r>
+              <a:rPr lang="de-DE" dirty="0"/>
+              <a:t>Neukunden gewinnen</a:t>
+            </a:r>
+          </a:p>
+          <a:p>
+            <a:endParaRPr lang="de-DE" dirty="0"/>
+          </a:p>
+          <a:p>
+            <a:endParaRPr lang="de-DE" dirty="0"/>
+          </a:p>
+        </p:txBody>
+      </p:sp>
+    </p:spTree>
+  </p:cSld>
+  <p:clrMapOvr>
+    <a:masterClrMapping/>
+  </p:clrMapOvr>
+</p:sld>
+</file>
+
+<file path=ppt/slides/slide5.xml><?xml version="1.0" encoding="utf-8"?>
+<p:sld xmlns:a="http://schemas.openxmlformats.org/drawingml/2006/main" xmlns:r="http://schemas.openxmlformats.org/officeDocument/2006/relationships" xmlns:p="http://schemas.openxmlformats.org/presentationml/2006/main">
+  <p:cSld>
+    <p:spTree>
+      <p:nvGrpSpPr>
+        <p:cNvPr id="1" name=""/>
+        <p:cNvGrpSpPr/>
+        <p:nvPr/>
+      </p:nvGrpSpPr>
+      <p:grpSpPr>
+        <a:xfrm>
+          <a:off x="0" y="0"/>
+          <a:ext cx="0" cy="0"/>
+          <a:chOff x="0" y="0"/>
+          <a:chExt cx="0" cy="0"/>
+        </a:xfrm>
+      </p:grpSpPr>
+      <p:sp>
+        <p:nvSpPr>
+          <p:cNvPr id="2" name="Titel 1"/>
+          <p:cNvSpPr>
+            <a:spLocks noGrp="1"/>
+          </p:cNvSpPr>
+          <p:nvPr>
+            <p:ph type="title"/>
+          </p:nvPr>
+        </p:nvSpPr>
+        <p:spPr/>
+        <p:txBody>
+          <a:bodyPr/>
+          <a:lstStyle/>
+          <a:p>
+            <a:r>
+              <a:rPr lang="de-DE" dirty="0"/>
+              <a:t>Marktanalyse - Zielgruppe</a:t>
+            </a:r>
+          </a:p>
+        </p:txBody>
+      </p:sp>
+      <p:sp>
+        <p:nvSpPr>
+          <p:cNvPr id="3" name="Inhaltsplatzhalter 2"/>
+          <p:cNvSpPr>
+            <a:spLocks noGrp="1"/>
+          </p:cNvSpPr>
+          <p:nvPr>
+            <p:ph idx="1"/>
+          </p:nvPr>
+        </p:nvSpPr>
+        <p:spPr/>
+        <p:txBody>
+          <a:bodyPr/>
+          <a:lstStyle/>
+          <a:p>
+            <a:r>
+              <a:rPr lang="de-DE" dirty="0"/>
+              <a:t>Breite Zielgruppe</a:t>
+            </a:r>
+          </a:p>
+          <a:p>
+            <a:pPr lvl="1"/>
+            <a:r>
+              <a:rPr lang="de-DE" dirty="0"/>
+              <a:t>18+ bis …</a:t>
+            </a:r>
+          </a:p>
+          <a:p>
+            <a:pPr lvl="1"/>
+            <a:r>
+              <a:rPr lang="de-DE" dirty="0"/>
+              <a:t>Alle Geschlechter</a:t>
+            </a:r>
+          </a:p>
+          <a:p>
+            <a:pPr lvl="1"/>
+            <a:r>
+              <a:rPr lang="de-DE" dirty="0"/>
+              <a:t>Privatpersonen und Geschäftspersonen</a:t>
+            </a:r>
+          </a:p>
+          <a:p>
+            <a:pPr lvl="1"/>
+            <a:r>
+              <a:rPr lang="de-DE" dirty="0"/>
+              <a:t>Hauptsächlich Erstverkäufer aber auch Mehrfachverkäufer</a:t>
+            </a:r>
+          </a:p>
+          <a:p>
+            <a:pPr lvl="1"/>
+            <a:r>
+              <a:rPr lang="de-DE" dirty="0"/>
+              <a:t>Kaum Einschränkungen</a:t>
+            </a:r>
+          </a:p>
+          <a:p>
+            <a:endParaRPr lang="de-DE" dirty="0"/>
+          </a:p>
+          <a:p>
+            <a:endParaRPr lang="de-DE" dirty="0"/>
+          </a:p>
+          <a:p>
+            <a:endParaRPr lang="de-DE" dirty="0"/>
+          </a:p>
+        </p:txBody>
+      </p:sp>
+    </p:spTree>
+  </p:cSld>
+  <p:clrMapOvr>
+    <a:masterClrMapping/>
+  </p:clrMapOvr>
+</p:sld>
+</file>
+
+<file path=ppt/slides/slide6.xml><?xml version="1.0" encoding="utf-8"?>
 <p:sld xmlns:a="http://schemas.openxmlformats.org/drawingml/2006/main" xmlns:r="http://schemas.openxmlformats.org/officeDocument/2006/relationships" xmlns:p="http://schemas.openxmlformats.org/presentationml/2006/main">
   <p:cSld>
     <p:spTree>
@@ -8279,7 +8950,7 @@
 </p:sld>
 </file>
 
-<file path=ppt/slides/slide5.xml><?xml version="1.0" encoding="utf-8"?>
+<file path=ppt/slides/slide7.xml><?xml version="1.0" encoding="utf-8"?>
 <p:sld xmlns:a="http://schemas.openxmlformats.org/drawingml/2006/main" xmlns:r="http://schemas.openxmlformats.org/officeDocument/2006/relationships" xmlns:p="http://schemas.openxmlformats.org/presentationml/2006/main">
   <p:cSld>
     <p:spTree>
@@ -8401,7 +9072,7 @@
 </p:sld>
 </file>
 
-<file path=ppt/slides/slide6.xml><?xml version="1.0" encoding="utf-8"?>
+<file path=ppt/slides/slide8.xml><?xml version="1.0" encoding="utf-8"?>
 <p:sld xmlns:a="http://schemas.openxmlformats.org/drawingml/2006/main" xmlns:r="http://schemas.openxmlformats.org/officeDocument/2006/relationships" xmlns:p="http://schemas.openxmlformats.org/presentationml/2006/main">
   <p:cSld>
     <p:spTree>
@@ -8517,7 +9188,7 @@
 </p:sld>
 </file>
 
-<file path=ppt/slides/slide7.xml><?xml version="1.0" encoding="utf-8"?>
+<file path=ppt/slides/slide9.xml><?xml version="1.0" encoding="utf-8"?>
 <p:sld xmlns:a="http://schemas.openxmlformats.org/drawingml/2006/main" xmlns:r="http://schemas.openxmlformats.org/officeDocument/2006/relationships" xmlns:p="http://schemas.openxmlformats.org/presentationml/2006/main">
   <p:cSld>
     <p:spTree>
@@ -8939,252 +9610,6 @@
         </p:txBody>
       </p:sp>
     </p:spTree>
-  </p:cSld>
-  <p:clrMapOvr>
-    <a:masterClrMapping/>
-  </p:clrMapOvr>
-</p:sld>
-</file>
-
-<file path=ppt/slides/slide8.xml><?xml version="1.0" encoding="utf-8"?>
-<p:sld xmlns:a="http://schemas.openxmlformats.org/drawingml/2006/main" xmlns:r="http://schemas.openxmlformats.org/officeDocument/2006/relationships" xmlns:p="http://schemas.openxmlformats.org/presentationml/2006/main">
-  <p:cSld>
-    <p:spTree>
-      <p:nvGrpSpPr>
-        <p:cNvPr id="1" name=""/>
-        <p:cNvGrpSpPr/>
-        <p:nvPr/>
-      </p:nvGrpSpPr>
-      <p:grpSpPr>
-        <a:xfrm>
-          <a:off x="0" y="0"/>
-          <a:ext cx="0" cy="0"/>
-          <a:chOff x="0" y="0"/>
-          <a:chExt cx="0" cy="0"/>
-        </a:xfrm>
-      </p:grpSpPr>
-      <p:sp>
-        <p:nvSpPr>
-          <p:cNvPr id="2" name="Titel 1"/>
-          <p:cNvSpPr>
-            <a:spLocks noGrp="1"/>
-          </p:cNvSpPr>
-          <p:nvPr>
-            <p:ph type="title"/>
-          </p:nvPr>
-        </p:nvSpPr>
-        <p:spPr/>
-        <p:txBody>
-          <a:bodyPr>
-            <a:normAutofit/>
-          </a:bodyPr>
-          <a:lstStyle/>
-          <a:p>
-            <a:r>
-              <a:rPr lang="de-DE" dirty="0"/>
-              <a:t>Marktanalyse – Weitere Faktoren</a:t>
-            </a:r>
-          </a:p>
-        </p:txBody>
-      </p:sp>
-      <p:sp>
-        <p:nvSpPr>
-          <p:cNvPr id="3" name="Inhaltsplatzhalter 2"/>
-          <p:cNvSpPr>
-            <a:spLocks noGrp="1"/>
-          </p:cNvSpPr>
-          <p:nvPr>
-            <p:ph idx="1"/>
-          </p:nvPr>
-        </p:nvSpPr>
-        <p:spPr/>
-        <p:txBody>
-          <a:bodyPr/>
-          <a:lstStyle/>
-          <a:p>
-            <a:r>
-              <a:rPr lang="de-DE" dirty="0"/>
-              <a:t>Fahrverbote für Diesel-Fahrzeuge</a:t>
-            </a:r>
-          </a:p>
-          <a:p>
-            <a:pPr lvl="1"/>
-            <a:r>
-              <a:rPr lang="de-DE" dirty="0"/>
-              <a:t>Mehr Neuwagenkäufe : mehr Gebrauchtwagen</a:t>
-            </a:r>
-          </a:p>
-          <a:p>
-            <a:r>
-              <a:rPr lang="de-DE" dirty="0"/>
-              <a:t>Schwerverkäufliche Diesel-Fahrzeuge </a:t>
-            </a:r>
-          </a:p>
-          <a:p>
-            <a:pPr lvl="1"/>
-            <a:r>
-              <a:rPr lang="de-DE" dirty="0"/>
-              <a:t>Händler verbreitern ihre Reichweiten durch neue Plattformen</a:t>
-            </a:r>
-          </a:p>
-          <a:p>
-            <a:r>
-              <a:rPr lang="de-DE" dirty="0"/>
-              <a:t>Interesse an Gebrauchtfahrzeugen steigt</a:t>
-            </a:r>
-          </a:p>
-        </p:txBody>
-      </p:sp>
-    </p:spTree>
-  </p:cSld>
-  <p:clrMapOvr>
-    <a:masterClrMapping/>
-  </p:clrMapOvr>
-</p:sld>
-</file>
-
-<file path=ppt/slides/slide9.xml><?xml version="1.0" encoding="utf-8"?>
-<p:sld xmlns:a="http://schemas.openxmlformats.org/drawingml/2006/main" xmlns:r="http://schemas.openxmlformats.org/officeDocument/2006/relationships" xmlns:p="http://schemas.openxmlformats.org/presentationml/2006/main">
-  <p:cSld>
-    <p:spTree>
-      <p:nvGrpSpPr>
-        <p:cNvPr id="1" name=""/>
-        <p:cNvGrpSpPr/>
-        <p:nvPr/>
-      </p:nvGrpSpPr>
-      <p:grpSpPr>
-        <a:xfrm>
-          <a:off x="0" y="0"/>
-          <a:ext cx="0" cy="0"/>
-          <a:chOff x="0" y="0"/>
-          <a:chExt cx="0" cy="0"/>
-        </a:xfrm>
-      </p:grpSpPr>
-      <p:sp>
-        <p:nvSpPr>
-          <p:cNvPr id="2" name="Titel 1">
-            <a:extLst>
-              <a:ext uri="{FF2B5EF4-FFF2-40B4-BE49-F238E27FC236}">
-                <a16:creationId xmlns:a16="http://schemas.microsoft.com/office/drawing/2014/main" id="{04B64357-0EE4-45AC-9770-F6FFFD376720}"/>
-              </a:ext>
-            </a:extLst>
-          </p:cNvPr>
-          <p:cNvSpPr>
-            <a:spLocks noGrp="1"/>
-          </p:cNvSpPr>
-          <p:nvPr>
-            <p:ph type="title"/>
-          </p:nvPr>
-        </p:nvSpPr>
-        <p:spPr/>
-        <p:txBody>
-          <a:bodyPr/>
-          <a:lstStyle/>
-          <a:p>
-            <a:r>
-              <a:rPr lang="de-DE" dirty="0">
-                <a:cs typeface="Calibri Light"/>
-              </a:rPr>
-              <a:t>Distributionspolitik</a:t>
-            </a:r>
-            <a:endParaRPr lang="de-DE" dirty="0"/>
-          </a:p>
-          <a:p>
-            <a:endParaRPr lang="de-DE" dirty="0">
-              <a:cs typeface="Calibri Light"/>
-            </a:endParaRPr>
-          </a:p>
-        </p:txBody>
-      </p:sp>
-      <p:sp>
-        <p:nvSpPr>
-          <p:cNvPr id="3" name="Inhaltsplatzhalter 2">
-            <a:extLst>
-              <a:ext uri="{FF2B5EF4-FFF2-40B4-BE49-F238E27FC236}">
-                <a16:creationId xmlns:a16="http://schemas.microsoft.com/office/drawing/2014/main" id="{EA2DB675-491C-4047-964A-FDB43988A241}"/>
-              </a:ext>
-            </a:extLst>
-          </p:cNvPr>
-          <p:cNvSpPr>
-            <a:spLocks noGrp="1"/>
-          </p:cNvSpPr>
-          <p:nvPr>
-            <p:ph idx="1"/>
-          </p:nvPr>
-        </p:nvSpPr>
-        <p:spPr/>
-        <p:txBody>
-          <a:bodyPr vert="horz" lIns="68580" tIns="34290" rIns="68580" bIns="34290" rtlCol="0" anchor="t">
-            <a:normAutofit/>
-          </a:bodyPr>
-          <a:lstStyle/>
-          <a:p>
-            <a:r>
-              <a:rPr lang="de-DE" dirty="0">
-                <a:cs typeface="Calibri"/>
-              </a:rPr>
-              <a:t>Eine Website, keine verkaufbare Software</a:t>
-            </a:r>
-          </a:p>
-          <a:p>
-            <a:r>
-              <a:rPr lang="de-DE" dirty="0">
-                <a:cs typeface="Calibri"/>
-              </a:rPr>
-              <a:t>-&gt; nicht verteilbar</a:t>
-            </a:r>
-          </a:p>
-          <a:p>
-            <a:r>
-              <a:rPr lang="de-DE" dirty="0">
-                <a:cs typeface="Calibri"/>
-              </a:rPr>
-              <a:t>Kunden kommen zu uns</a:t>
-            </a:r>
-          </a:p>
-          <a:p>
-            <a:pPr marL="0" indent="0">
-              <a:buNone/>
-            </a:pPr>
-            <a:endParaRPr lang="de-DE" dirty="0">
-              <a:cs typeface="Calibri"/>
-            </a:endParaRPr>
-          </a:p>
-          <a:p>
-            <a:r>
-              <a:rPr lang="de-DE" dirty="0" err="1">
-                <a:cs typeface="Calibri"/>
-              </a:rPr>
-              <a:t>Premiumaccounts</a:t>
-            </a:r>
-            <a:r>
-              <a:rPr lang="de-DE" dirty="0">
-                <a:cs typeface="Calibri"/>
-              </a:rPr>
-              <a:t> nur auf direktem Absatzweg</a:t>
-            </a:r>
-          </a:p>
-          <a:p>
-            <a:endParaRPr lang="de-DE" dirty="0">
-              <a:cs typeface="Calibri"/>
-            </a:endParaRPr>
-          </a:p>
-          <a:p>
-            <a:r>
-              <a:rPr lang="de-DE" dirty="0">
-                <a:cs typeface="Calibri"/>
-              </a:rPr>
-              <a:t>Keine Filialen</a:t>
-            </a:r>
-          </a:p>
-        </p:txBody>
-      </p:sp>
-    </p:spTree>
-    <p:extLst>
-      <p:ext uri="{BB962C8B-B14F-4D97-AF65-F5344CB8AC3E}">
-        <p14:creationId xmlns:p14="http://schemas.microsoft.com/office/powerpoint/2010/main" val="3540266070"/>
-      </p:ext>
-    </p:extLst>
   </p:cSld>
   <p:clrMapOvr>
     <a:masterClrMapping/>

</xml_diff>